<commit_message>
feat(Presentations): recompile all musics
</commit_message>
<xml_diff>
--- a/Presentations/A_RUA_E_O_MUNDO-ipalpha.pptx
+++ b/Presentations/A_RUA_E_O_MUNDO-ipalpha.pptx
@@ -15,11 +15,13 @@
     <p:sldId xmlns:r="http://schemas.openxmlformats.org/officeDocument/2006/relationships" id="263" r:id="rId9"/>
   </p:sldIdLst>
   <p:sldSz cx="12192000" cy="6858000" type="screen16x9"/>
+  <p:notesSz cx="12192000" cy="9144000"/>
+  <p:defaultTextStyle/>
 </p:presentation>
 </file>
 
 <file path=ppt/slideLayouts/slideLayout1.xml><?xml version="1.0" encoding="utf-8"?>
-<p:sldLayout xmlns:p="http://schemas.openxmlformats.org/presentationml/2006/main">
+<p:sldLayout xmlns:p="http://schemas.openxmlformats.org/presentationml/2006/main" type="title">
   <p:cSld>
     <p:spTree>
       <p:nvGrpSpPr>
@@ -30,6 +32,101 @@
       <p:grpSpPr>
         <a:xfrm xmlns:a="http://schemas.openxmlformats.org/drawingml/2006/main"/>
       </p:grpSpPr>
+      <p:sp>
+        <p:nvSpPr>
+          <p:cNvPr id="2" name="Title 1"/>
+          <p:cNvSpPr>
+            <a:spLocks xmlns:a="http://schemas.openxmlformats.org/drawingml/2006/main" noGrp="1"/>
+          </p:cNvSpPr>
+          <p:nvPr>
+            <p:ph type="title"/>
+          </p:nvPr>
+        </p:nvSpPr>
+        <p:spPr>
+          <a:xfrm xmlns:a="http://schemas.openxmlformats.org/drawingml/2006/main">
+            <a:off x="914400" y="1828800"/>
+            <a:ext cx="10297200" cy="1368296"/>
+          </a:xfrm>
+        </p:spPr>
+        <p:txBody>
+          <a:bodyPr xmlns:a="http://schemas.openxmlformats.org/drawingml/2006/main" anchor="ctr"/>
+          <a:lstStyle xmlns:a="http://schemas.openxmlformats.org/drawingml/2006/main"/>
+          <a:p xmlns:a="http://schemas.openxmlformats.org/drawingml/2006/main">
+            <a:pPr algn="ctr"/>
+            <a:endParaRPr lang="en-US" sz="4400" b="1"/>
+          </a:p>
+        </p:txBody>
+      </p:sp>
+      <p:sp>
+        <p:nvSpPr>
+          <p:cNvPr id="3" name="Subtitle 2"/>
+          <p:cNvSpPr>
+            <a:spLocks xmlns:a="http://schemas.openxmlformats.org/drawingml/2006/main" noGrp="1"/>
+          </p:cNvSpPr>
+          <p:nvPr>
+            <p:ph type="subTitle"/>
+          </p:nvPr>
+        </p:nvSpPr>
+        <p:spPr>
+          <a:xfrm xmlns:a="http://schemas.openxmlformats.org/drawingml/2006/main">
+            <a:off x="914400" y="3429000"/>
+            <a:ext cx="10297200" cy="1000000"/>
+          </a:xfrm>
+        </p:spPr>
+        <p:txBody>
+          <a:bodyPr xmlns:a="http://schemas.openxmlformats.org/drawingml/2006/main" anchor="ctr"/>
+          <a:lstStyle xmlns:a="http://schemas.openxmlformats.org/drawingml/2006/main"/>
+          <a:p xmlns:a="http://schemas.openxmlformats.org/drawingml/2006/main">
+            <a:pPr algn="ctr"/>
+            <a:endParaRPr lang="en-US" sz="2800"/>
+          </a:p>
+        </p:txBody>
+      </p:sp>
+    </p:spTree>
+  </p:cSld>
+  <p:clrMapOvr>
+    <a:masterClrMapping xmlns:a="http://schemas.openxmlformats.org/drawingml/2006/main"/>
+  </p:clrMapOvr>
+</p:sldLayout>
+</file>
+
+<file path=ppt/slideLayouts/slideLayout2.xml><?xml version="1.0" encoding="utf-8"?>
+<p:sldLayout xmlns:p="http://schemas.openxmlformats.org/presentationml/2006/main" type="blank">
+  <p:cSld>
+    <p:spTree>
+      <p:nvGrpSpPr>
+        <p:cNvPr id="1" name=""/>
+        <p:cNvGrpSpPr/>
+        <p:nvPr/>
+      </p:nvGrpSpPr>
+      <p:grpSpPr>
+        <a:xfrm xmlns:a="http://schemas.openxmlformats.org/drawingml/2006/main"/>
+      </p:grpSpPr>
+      <p:sp>
+        <p:nvSpPr>
+          <p:cNvPr id="2" name="Content Placeholder 1"/>
+          <p:cNvSpPr>
+            <a:spLocks xmlns:a="http://schemas.openxmlformats.org/drawingml/2006/main" noGrp="1"/>
+          </p:cNvSpPr>
+          <p:nvPr>
+            <p:ph type="body"/>
+          </p:nvPr>
+        </p:nvSpPr>
+        <p:spPr>
+          <a:xfrm xmlns:a="http://schemas.openxmlformats.org/drawingml/2006/main">
+            <a:off x="914400" y="1000000"/>
+            <a:ext cx="10297200" cy="4858000"/>
+          </a:xfrm>
+        </p:spPr>
+        <p:txBody>
+          <a:bodyPr xmlns:a="http://schemas.openxmlformats.org/drawingml/2006/main" wrap="square" anchor="ctr"/>
+          <a:lstStyle xmlns:a="http://schemas.openxmlformats.org/drawingml/2006/main"/>
+          <a:p xmlns:a="http://schemas.openxmlformats.org/drawingml/2006/main">
+            <a:pPr algn="ctr"/>
+            <a:endParaRPr lang="en-US" sz="3200"/>
+          </a:p>
+        </p:txBody>
+      </p:sp>
     </p:spTree>
   </p:cSld>
   <p:clrMapOvr>
@@ -44,16 +141,218 @@
     <p:spTree>
       <p:nvGrpSpPr>
         <p:cNvPr id="1" name=""/>
-        <p:cNvGrpSpPr/>
+        <p:nvGrpSpPr/>
         <p:nvPr/>
       </p:nvGrpSpPr>
       <p:grpSpPr>
         <a:xfrm xmlns:a="http://schemas.openxmlformats.org/drawingml/2006/main"/>
       </p:grpSpPr>
+      <p:sp>
+        <p:nvSpPr>
+          <p:cNvPr id="2" name="Title Placeholder 1"/>
+          <p:cNvSpPr>
+            <a:spLocks xmlns:a="http://schemas.openxmlformats.org/drawingml/2006/main" noGrp="1"/>
+          </p:cNvSpPr>
+          <p:nvPr>
+            <p:ph type="title"/>
+          </p:nvPr>
+        </p:nvSpPr>
+        <p:spPr/>
+        <p:txBody>
+          <a:bodyPr xmlns:a="http://schemas.openxmlformats.org/drawingml/2006/main"/>
+          <a:lstStyle xmlns:a="http://schemas.openxmlformats.org/drawingml/2006/main"/>
+          <a:p xmlns:a="http://schemas.openxmlformats.org/drawingml/2006/main">
+            <a:endParaRPr lang="en-US"/>
+          </a:p>
+        </p:txBody>
+      </p:sp>
+      <p:sp>
+        <p:nvSpPr>
+          <p:cNvPr id="3" name="Content Placeholder 2"/>
+          <p:cNvSpPr>
+            <a:spLocks xmlns:a="http://schemas.openxmlformats.org/drawingml/2006/main" noGrp="1"/>
+          </p:cNvSpPr>
+          <p:nvPr>
+            <p:ph type="body"/>
+          </p:nvPr>
+        </p:nvSpPr>
+        <p:spPr/>
+        <p:txBody>
+          <a:bodyPr xmlns:a="http://schemas.openxmlformats.org/drawingml/2006/main"/>
+          <a:lstStyle xmlns:a="http://schemas.openxmlformats.org/drawingml/2006/main"/>
+          <a:p xmlns:a="http://schemas.openxmlformats.org/drawingml/2006/main">
+            <a:endParaRPr lang="en-US"/>
+          </a:p>
+        </p:txBody>
+      </p:sp>
     </p:spTree>
   </p:cSld>
   <p:clrMap bg1="lt1" tx1="dk1" bg2="lt2" tx2="dk2" accent1="accent1" accent2="accent2" accent3="accent3" accent4="accent4" accent5="accent5" accent6="accent6" hlink="hlink" folHlink="folHlink"/>
+  <p:sldLayoutIdLst>
+    <p:sldLayoutId xmlns:r="http://schemas.openxmlformats.org/officeDocument/2006/relationships" id="2147483649" r:id="rId2"/>
+    <p:sldLayoutId xmlns:r="http://schemas.openxmlformats.org/officeDocument/2006/relationships" id="2147483650" r:id="rId3"/>
+  </p:sldLayoutIdLst>
 </p:sldMaster>
+</file>
+
+<file path=ppt/slideMasters/theme/theme1.xml><?xml version="1.0" encoding="utf-8"?>
+<a:theme xmlns:a="http://schemas.openxmlformats.org/drawingml/2006/main" name="Office Theme">
+  <a:themeElements>
+    <a:clrScheme name="Office">
+      <a:dk1>
+        <a:sysClr val="windowText"/>
+      </a:dk1>
+      <a:lt1>
+        <a:sysClr val="window"/>
+      </a:lt1>
+      <a:dk2>
+        <a:srgbClr val="1F497D"/>
+      </a:dk2>
+      <a:lt2>
+        <a:srgbClr val="EEECE1"/>
+      </a:lt2>
+      <a:accent1>
+        <a:srgbClr val="4F81BD"/>
+      </a:accent1>
+      <a:accent2>
+        <a:srgbClr val="F79646"/>
+      </a:accent2>
+      <a:accent3>
+        <a:srgbClr val="9BBB59"/>
+      </a:accent3>
+      <a:accent4>
+        <a:srgbClr val="8064A2"/>
+      </a:accent4>
+      <a:accent5>
+        <a:srgbClr val="4BACC6"/>
+      </a:accent5>
+      <a:accent6>
+        <a:srgbClr val="F366A7"/>
+      </a:accent6>
+      <a:hlink>
+        <a:srgbClr val="0000FF"/>
+      </a:hlink>
+      <a:folHlink>
+        <a:srgbClr val="800080"/>
+      </a:folHlink>
+    </a:clrScheme>
+    <a:fontScheme name="Office">
+      <a:majorFont>
+        <a:latin typeface="Calibri Light"/>
+        <a:ea typeface=""/>
+        <a:cs typeface=""/>
+      </a:majorFont>
+      <a:minorFont>
+        <a:latin typeface="Calibri"/>
+        <a:ea typeface=""/>
+        <a:cs typeface=""/>
+      </a:minorFont>
+    </a:fontScheme>
+    <a:fmtScheme name="Office">
+      <a:fillStyleLst>
+        <a:solidFill>
+          <a:schemeClr val="phClr"/>
+        </a:solidFill>
+        <a:gradFill>
+          <a:gsLst>
+            <a:gs pos="0">
+              <a:schemeClr val="phClr"/>
+            </a:gs>
+            <a:gs pos="100000">
+              <a:schemeClr val="phClr"/>
+            </a:gs>
+          </a:gsLst>
+          <a:lin ang="5400000" scaled="1"/>
+        </a:gradFill>
+        <a:gradFill>
+          <a:gsLst>
+            <a:gs pos="0">
+              <a:schemeClr val="phClr"/>
+            </a:gs>
+            <a:gs pos="100000">
+              <a:schemeClr val="phClr"/>
+            </a:gs>
+          </a:gsLst>
+          <a:lin ang="5400000" scaled="1"/>
+        </a:gradFill>
+      </a:fillStyleLst>
+      <a:lnStyleLst>
+        <a:ln w="9525">
+          <a:solidFill>
+            <a:schemeClr val="phClr"/>
+          </a:solidFill>
+          <a:prstDash val="solid"/>
+        </a:ln>
+        <a:ln w="25400">
+          <a:solidFill>
+            <a:schemeClr val="phClr"/>
+          </a:solidFill>
+        </a:ln>
+        <a:ln w="38100">
+          <a:solidFill>
+            <a:schemeClr val="phClr"/>
+          </a:solidFill>
+        </a:ln>
+      </a:lnStyleLst>
+      <a:effectStyleLst>
+        <a:effectStyle>
+          <a:effectLst>
+            <a:outerShdw blurRad="40000" dist="20000" dir="5400000" rotWithShape="0">
+              <a:srgbClr val="000000">
+                <a:alpha val="38000"/>
+              </a:srgbClr>
+            </a:outerShdw>
+          </a:effectLst>
+        </a:effectStyle>
+        <a:effectStyle>
+          <a:effectLst>
+            <a:outerShdw blurRad="40000" dist="23000" dir="5400000" rotWithShape="0">
+              <a:srgbClr val="000000">
+                <a:alpha val="35000"/>
+              </a:srgbClr>
+            </a:outerShdw>
+          </a:effectLst>
+        </a:effectStyle>
+        <a:effectStyle>
+          <a:effectLst>
+            <a:outerShdw blurRad="40000" dist="23000" dir="5400000" rotWithShape="0">
+              <a:srgbClr val="000000">
+                <a:alpha val="35000"/>
+              </a:srgbClr>
+            </a:outerShdw>
+          </a:effectLst>
+        </a:effectStyle>
+      </a:effectStyleLst>
+      <a:bgFillStyleLst>
+        <a:solidFill>
+          <a:schemeClr val="phClr"/>
+        </a:solidFill>
+        <a:gradFill>
+          <a:gsLst>
+            <a:gs pos="0">
+              <a:schemeClr val="phClr"/>
+            </a:gs>
+            <a:gs pos="100000">
+              <a:schemeClr val="phClr"/>
+            </a:gs>
+          </a:gsLst>
+          <a:lin ang="5400000" scaled="1"/>
+        </a:gradFill>
+        <a:gradFill>
+          <a:gsLst>
+            <a:gs pos="0">
+              <a:schemeClr val="phClr"/>
+            </a:gs>
+            <a:gs pos="100000">
+              <a:schemeClr val="phClr"/>
+            </a:gs>
+          </a:gsLst>
+          <a:lin ang="5400000" scaled="1"/>
+        </a:gradFill>
+      </a:bgFillStyleLst>
+    </a:fmtScheme>
+  </a:themeElements>
+</a:theme>
 </file>
 
 <file path=ppt/slides/slide1.xml><?xml version="1.0" encoding="utf-8"?>
@@ -90,7 +389,11 @@
           <a:p xmlns:a="http://schemas.openxmlformats.org/drawingml/2006/main">
             <a:pPr algn="ctr"/>
             <a:r>
-              <a:rPr sz="4400" b="1"/>
+              <a:rPr sz="4400" b="1">
+                <a:solidFill>
+                  <a:schemeClr val="tx1"/>
+                </a:solidFill>
+              </a:rPr>
               <a:t>A rua e o Mundo</a:t>
             </a:r>
           </a:p>
@@ -102,7 +405,9 @@
           <p:cNvSpPr>
             <a:spLocks xmlns:a="http://schemas.openxmlformats.org/drawingml/2006/main" noGrp="1"/>
           </p:cNvSpPr>
-          <p:nvPr/>
+          <p:nvPr>
+            <p:ph type="subTitle"/>
+          </p:nvPr>
         </p:nvSpPr>
         <p:spPr>
           <a:xfrm xmlns:a="http://schemas.openxmlformats.org/drawingml/2006/main">
@@ -116,7 +421,11 @@
           <a:p xmlns:a="http://schemas.openxmlformats.org/drawingml/2006/main">
             <a:pPr algn="ctr"/>
             <a:r>
-              <a:rPr sz="2800"/>
+              <a:rPr sz="2800">
+                <a:solidFill>
+                  <a:schemeClr val="tx2"/>
+                </a:solidFill>
+              </a:rPr>
               <a:t>Por: IPALPHA</a:t>
             </a:r>
           </a:p>
@@ -148,7 +457,9 @@
           <p:cNvSpPr>
             <a:spLocks xmlns:a="http://schemas.openxmlformats.org/drawingml/2006/main" noGrp="1"/>
           </p:cNvSpPr>
-          <p:nvPr/>
+          <p:nvPr>
+            <p:ph type="body"/>
+          </p:nvPr>
         </p:nvSpPr>
         <p:spPr>
           <a:xfrm xmlns:a="http://schemas.openxmlformats.org/drawingml/2006/main">
@@ -162,56 +473,88 @@
           <a:p xmlns:a="http://schemas.openxmlformats.org/drawingml/2006/main">
             <a:pPr algn="ctr"/>
             <a:r>
-              <a:rPr sz="3200"/>
+              <a:rPr sz="3200">
+                <a:solidFill>
+                  <a:schemeClr val="tx1"/>
+                </a:solidFill>
+              </a:rPr>
               <a:t>O Amor veio a nós</a:t>
             </a:r>
           </a:p>
           <a:p xmlns:a="http://schemas.openxmlformats.org/drawingml/2006/main">
             <a:pPr algn="ctr"/>
             <a:r>
-              <a:rPr sz="3200"/>
+              <a:rPr sz="3200">
+                <a:solidFill>
+                  <a:schemeClr val="tx1"/>
+                </a:solidFill>
+              </a:rPr>
               <a:t>E como um de nós se deu</a:t>
             </a:r>
           </a:p>
           <a:p xmlns:a="http://schemas.openxmlformats.org/drawingml/2006/main">
             <a:pPr algn="ctr"/>
             <a:r>
-              <a:rPr sz="3200"/>
+              <a:rPr sz="3200">
+                <a:solidFill>
+                  <a:schemeClr val="tx1"/>
+                </a:solidFill>
+              </a:rPr>
               <a:t>Pra dizer ao mundo</a:t>
             </a:r>
           </a:p>
           <a:p xmlns:a="http://schemas.openxmlformats.org/drawingml/2006/main">
             <a:pPr algn="ctr"/>
             <a:r>
-              <a:rPr sz="3200"/>
+              <a:rPr sz="3200">
+                <a:solidFill>
+                  <a:schemeClr val="tx1"/>
+                </a:solidFill>
+              </a:rPr>
               <a:t>Que o reino vem</a:t>
             </a:r>
           </a:p>
           <a:p xmlns:a="http://schemas.openxmlformats.org/drawingml/2006/main">
             <a:pPr algn="ctr"/>
             <a:r>
-              <a:rPr sz="3200"/>
+              <a:rPr sz="3200">
+                <a:solidFill>
+                  <a:schemeClr val="tx1"/>
+                </a:solidFill>
+              </a:rPr>
               <a:t>E entre os povos</a:t>
             </a:r>
           </a:p>
           <a:p xmlns:a="http://schemas.openxmlformats.org/drawingml/2006/main">
             <a:pPr algn="ctr"/>
             <a:r>
-              <a:rPr sz="3200"/>
+              <a:rPr sz="3200">
+                <a:solidFill>
+                  <a:schemeClr val="tx1"/>
+                </a:solidFill>
+              </a:rPr>
               <a:t>Já posso ouvir</a:t>
             </a:r>
           </a:p>
           <a:p xmlns:a="http://schemas.openxmlformats.org/drawingml/2006/main">
             <a:pPr algn="ctr"/>
             <a:r>
-              <a:rPr sz="3200"/>
+              <a:rPr sz="3200">
+                <a:solidFill>
+                  <a:schemeClr val="tx1"/>
+                </a:solidFill>
+              </a:rPr>
               <a:t>Aqueles que louvam</a:t>
             </a:r>
           </a:p>
           <a:p xmlns:a="http://schemas.openxmlformats.org/drawingml/2006/main">
             <a:pPr algn="ctr"/>
             <a:r>
-              <a:rPr sz="3200"/>
+              <a:rPr sz="3200">
+                <a:solidFill>
+                  <a:schemeClr val="tx1"/>
+                </a:solidFill>
+              </a:rPr>
               <a:t>O rei dos reis</a:t>
             </a:r>
           </a:p>
@@ -243,7 +586,9 @@
           <p:cNvSpPr>
             <a:spLocks xmlns:a="http://schemas.openxmlformats.org/drawingml/2006/main" noGrp="1"/>
           </p:cNvSpPr>
-          <p:nvPr/>
+          <p:nvPr>
+            <p:ph type="body"/>
+          </p:nvPr>
         </p:nvSpPr>
         <p:spPr>
           <a:xfrm xmlns:a="http://schemas.openxmlformats.org/drawingml/2006/main">
@@ -257,56 +602,88 @@
           <a:p xmlns:a="http://schemas.openxmlformats.org/drawingml/2006/main">
             <a:pPr algn="ctr"/>
             <a:r>
-              <a:rPr sz="3200"/>
+              <a:rPr sz="3200">
+                <a:solidFill>
+                  <a:schemeClr val="tx1"/>
+                </a:solidFill>
+              </a:rPr>
               <a:t>Seja eu a anunciar teu reino</a:t>
             </a:r>
           </a:p>
           <a:p xmlns:a="http://schemas.openxmlformats.org/drawingml/2006/main">
             <a:pPr algn="ctr"/>
             <a:r>
-              <a:rPr sz="3200"/>
+              <a:rPr sz="3200">
+                <a:solidFill>
+                  <a:schemeClr val="tx1"/>
+                </a:solidFill>
+              </a:rPr>
               <a:t>Com justiça e amor governas</a:t>
             </a:r>
           </a:p>
           <a:p xmlns:a="http://schemas.openxmlformats.org/drawingml/2006/main">
             <a:pPr algn="ctr"/>
             <a:r>
-              <a:rPr sz="3200"/>
+              <a:rPr sz="3200">
+                <a:solidFill>
+                  <a:schemeClr val="tx1"/>
+                </a:solidFill>
+              </a:rPr>
               <a:t>Eu não posso compreender</a:t>
             </a:r>
           </a:p>
           <a:p xmlns:a="http://schemas.openxmlformats.org/drawingml/2006/main">
             <a:pPr algn="ctr"/>
             <a:r>
-              <a:rPr sz="3200"/>
+              <a:rPr sz="3200">
+                <a:solidFill>
+                  <a:schemeClr val="tx1"/>
+                </a:solidFill>
+              </a:rPr>
               <a:t>Me rendo</a:t>
             </a:r>
           </a:p>
           <a:p xmlns:a="http://schemas.openxmlformats.org/drawingml/2006/main">
             <a:pPr algn="ctr"/>
             <a:r>
-              <a:rPr sz="3200"/>
+              <a:rPr sz="3200">
+                <a:solidFill>
+                  <a:schemeClr val="tx1"/>
+                </a:solidFill>
+              </a:rPr>
               <a:t>Erguerei a minha voz para dizer</a:t>
             </a:r>
           </a:p>
           <a:p xmlns:a="http://schemas.openxmlformats.org/drawingml/2006/main">
             <a:pPr algn="ctr"/>
             <a:r>
-              <a:rPr sz="3200"/>
+              <a:rPr sz="3200">
+                <a:solidFill>
+                  <a:schemeClr val="tx1"/>
+                </a:solidFill>
+              </a:rPr>
               <a:t>Por onde for</a:t>
             </a:r>
           </a:p>
           <a:p xmlns:a="http://schemas.openxmlformats.org/drawingml/2006/main">
             <a:pPr algn="ctr"/>
             <a:r>
-              <a:rPr sz="3200"/>
+              <a:rPr sz="3200">
+                <a:solidFill>
+                  <a:schemeClr val="tx1"/>
+                </a:solidFill>
+              </a:rPr>
               <a:t>Serei tuas mãos</a:t>
             </a:r>
           </a:p>
           <a:p xmlns:a="http://schemas.openxmlformats.org/drawingml/2006/main">
             <a:pPr algn="ctr"/>
             <a:r>
-              <a:rPr sz="3200"/>
+              <a:rPr sz="3200">
+                <a:solidFill>
+                  <a:schemeClr val="tx1"/>
+                </a:solidFill>
+              </a:rPr>
               <a:t>Aqui ou onde me enviar</a:t>
             </a:r>
           </a:p>
@@ -338,7 +715,9 @@
           <p:cNvSpPr>
             <a:spLocks xmlns:a="http://schemas.openxmlformats.org/drawingml/2006/main" noGrp="1"/>
           </p:cNvSpPr>
-          <p:nvPr/>
+          <p:nvPr>
+            <p:ph type="body"/>
+          </p:nvPr>
         </p:nvSpPr>
         <p:spPr>
           <a:xfrm xmlns:a="http://schemas.openxmlformats.org/drawingml/2006/main">
@@ -352,56 +731,88 @@
           <a:p xmlns:a="http://schemas.openxmlformats.org/drawingml/2006/main">
             <a:pPr algn="ctr"/>
             <a:r>
-              <a:rPr sz="3200"/>
+              <a:rPr sz="3200">
+                <a:solidFill>
+                  <a:schemeClr val="tx1"/>
+                </a:solidFill>
+              </a:rPr>
               <a:t>Me entrego, podes me usar</a:t>
             </a:r>
           </a:p>
           <a:p xmlns:a="http://schemas.openxmlformats.org/drawingml/2006/main">
             <a:pPr algn="ctr"/>
             <a:r>
-              <a:rPr sz="3200"/>
+              <a:rPr sz="3200">
+                <a:solidFill>
+                  <a:schemeClr val="tx1"/>
+                </a:solidFill>
+              </a:rPr>
               <a:t>Por onde for</a:t>
             </a:r>
           </a:p>
           <a:p xmlns:a="http://schemas.openxmlformats.org/drawingml/2006/main">
             <a:pPr algn="ctr"/>
             <a:r>
-              <a:rPr sz="3200"/>
+              <a:rPr sz="3200">
+                <a:solidFill>
+                  <a:schemeClr val="tx1"/>
+                </a:solidFill>
+              </a:rPr>
               <a:t>Seja expressão do teu amor</a:t>
             </a:r>
           </a:p>
           <a:p xmlns:a="http://schemas.openxmlformats.org/drawingml/2006/main">
             <a:pPr algn="ctr"/>
             <a:r>
-              <a:rPr sz="3200"/>
+              <a:rPr sz="3200">
+                <a:solidFill>
+                  <a:schemeClr val="tx1"/>
+                </a:solidFill>
+              </a:rPr>
               <a:t>Ao redor do mundo</a:t>
             </a:r>
           </a:p>
           <a:p xmlns:a="http://schemas.openxmlformats.org/drawingml/2006/main">
             <a:pPr algn="ctr"/>
             <a:r>
-              <a:rPr sz="3200"/>
+              <a:rPr sz="3200">
+                <a:solidFill>
+                  <a:schemeClr val="tx1"/>
+                </a:solidFill>
+              </a:rPr>
               <a:t>Ou do outro lado dessa rua</a:t>
             </a:r>
           </a:p>
           <a:p xmlns:a="http://schemas.openxmlformats.org/drawingml/2006/main">
             <a:pPr algn="ctr"/>
             <a:r>
-              <a:rPr sz="3200"/>
+              <a:rPr sz="3200">
+                <a:solidFill>
+                  <a:schemeClr val="tx1"/>
+                </a:solidFill>
+              </a:rPr>
               <a:t>Falarei do teu amor</a:t>
             </a:r>
           </a:p>
           <a:p xmlns:a="http://schemas.openxmlformats.org/drawingml/2006/main">
             <a:pPr algn="ctr"/>
             <a:r>
-              <a:rPr sz="3200"/>
+              <a:rPr sz="3200">
+                <a:solidFill>
+                  <a:schemeClr val="tx1"/>
+                </a:solidFill>
+              </a:rPr>
               <a:t>O Amor veio a nós</a:t>
             </a:r>
           </a:p>
           <a:p xmlns:a="http://schemas.openxmlformats.org/drawingml/2006/main">
             <a:pPr algn="ctr"/>
             <a:r>
-              <a:rPr sz="3200"/>
+              <a:rPr sz="3200">
+                <a:solidFill>
+                  <a:schemeClr val="tx1"/>
+                </a:solidFill>
+              </a:rPr>
               <a:t>E como um de nós se deu</a:t>
             </a:r>
           </a:p>
@@ -433,7 +844,9 @@
           <p:cNvSpPr>
             <a:spLocks xmlns:a="http://schemas.openxmlformats.org/drawingml/2006/main" noGrp="1"/>
           </p:cNvSpPr>
-          <p:nvPr/>
+          <p:nvPr>
+            <p:ph type="body"/>
+          </p:nvPr>
         </p:nvSpPr>
         <p:spPr>
           <a:xfrm xmlns:a="http://schemas.openxmlformats.org/drawingml/2006/main">
@@ -447,56 +860,88 @@
           <a:p xmlns:a="http://schemas.openxmlformats.org/drawingml/2006/main">
             <a:pPr algn="ctr"/>
             <a:r>
-              <a:rPr sz="3200"/>
+              <a:rPr sz="3200">
+                <a:solidFill>
+                  <a:schemeClr val="tx1"/>
+                </a:solidFill>
+              </a:rPr>
               <a:t>Pra dizer ao mundo</a:t>
             </a:r>
           </a:p>
           <a:p xmlns:a="http://schemas.openxmlformats.org/drawingml/2006/main">
             <a:pPr algn="ctr"/>
             <a:r>
-              <a:rPr sz="3200"/>
+              <a:rPr sz="3200">
+                <a:solidFill>
+                  <a:schemeClr val="tx1"/>
+                </a:solidFill>
+              </a:rPr>
               <a:t>Que o reino vem</a:t>
             </a:r>
           </a:p>
           <a:p xmlns:a="http://schemas.openxmlformats.org/drawingml/2006/main">
             <a:pPr algn="ctr"/>
             <a:r>
-              <a:rPr sz="3200"/>
+              <a:rPr sz="3200">
+                <a:solidFill>
+                  <a:schemeClr val="tx1"/>
+                </a:solidFill>
+              </a:rPr>
               <a:t>E entre os povos</a:t>
             </a:r>
           </a:p>
           <a:p xmlns:a="http://schemas.openxmlformats.org/drawingml/2006/main">
             <a:pPr algn="ctr"/>
             <a:r>
-              <a:rPr sz="3200"/>
+              <a:rPr sz="3200">
+                <a:solidFill>
+                  <a:schemeClr val="tx1"/>
+                </a:solidFill>
+              </a:rPr>
               <a:t>Já posso ouvir</a:t>
             </a:r>
           </a:p>
           <a:p xmlns:a="http://schemas.openxmlformats.org/drawingml/2006/main">
             <a:pPr algn="ctr"/>
             <a:r>
-              <a:rPr sz="3200"/>
+              <a:rPr sz="3200">
+                <a:solidFill>
+                  <a:schemeClr val="tx1"/>
+                </a:solidFill>
+              </a:rPr>
               <a:t>Aqueles que louvam</a:t>
             </a:r>
           </a:p>
           <a:p xmlns:a="http://schemas.openxmlformats.org/drawingml/2006/main">
             <a:pPr algn="ctr"/>
             <a:r>
-              <a:rPr sz="3200"/>
+              <a:rPr sz="3200">
+                <a:solidFill>
+                  <a:schemeClr val="tx1"/>
+                </a:solidFill>
+              </a:rPr>
               <a:t>O rei dos reis</a:t>
             </a:r>
           </a:p>
           <a:p xmlns:a="http://schemas.openxmlformats.org/drawingml/2006/main">
             <a:pPr algn="ctr"/>
             <a:r>
-              <a:rPr sz="3200"/>
+              <a:rPr sz="3200">
+                <a:solidFill>
+                  <a:schemeClr val="tx1"/>
+                </a:solidFill>
+              </a:rPr>
               <a:t>Seja eu a anunciar teu reino</a:t>
             </a:r>
           </a:p>
           <a:p xmlns:a="http://schemas.openxmlformats.org/drawingml/2006/main">
             <a:pPr algn="ctr"/>
             <a:r>
-              <a:rPr sz="3200"/>
+              <a:rPr sz="3200">
+                <a:solidFill>
+                  <a:schemeClr val="tx1"/>
+                </a:solidFill>
+              </a:rPr>
               <a:t>Com justiça e amor governas</a:t>
             </a:r>
           </a:p>
@@ -528,7 +973,9 @@
           <p:cNvSpPr>
             <a:spLocks xmlns:a="http://schemas.openxmlformats.org/drawingml/2006/main" noGrp="1"/>
           </p:cNvSpPr>
-          <p:nvPr/>
+          <p:nvPr>
+            <p:ph type="body"/>
+          </p:nvPr>
         </p:nvSpPr>
         <p:spPr>
           <a:xfrm xmlns:a="http://schemas.openxmlformats.org/drawingml/2006/main">
@@ -542,56 +989,88 @@
           <a:p xmlns:a="http://schemas.openxmlformats.org/drawingml/2006/main">
             <a:pPr algn="ctr"/>
             <a:r>
-              <a:rPr sz="3200"/>
+              <a:rPr sz="3200">
+                <a:solidFill>
+                  <a:schemeClr val="tx1"/>
+                </a:solidFill>
+              </a:rPr>
               <a:t>Eu não posso compreender</a:t>
             </a:r>
           </a:p>
           <a:p xmlns:a="http://schemas.openxmlformats.org/drawingml/2006/main">
             <a:pPr algn="ctr"/>
             <a:r>
-              <a:rPr sz="3200"/>
+              <a:rPr sz="3200">
+                <a:solidFill>
+                  <a:schemeClr val="tx1"/>
+                </a:solidFill>
+              </a:rPr>
               <a:t>Me rendo</a:t>
             </a:r>
           </a:p>
           <a:p xmlns:a="http://schemas.openxmlformats.org/drawingml/2006/main">
             <a:pPr algn="ctr"/>
             <a:r>
-              <a:rPr sz="3200"/>
+              <a:rPr sz="3200">
+                <a:solidFill>
+                  <a:schemeClr val="tx1"/>
+                </a:solidFill>
+              </a:rPr>
               <a:t>Erguerei a minha voz para dizer</a:t>
             </a:r>
           </a:p>
           <a:p xmlns:a="http://schemas.openxmlformats.org/drawingml/2006/main">
             <a:pPr algn="ctr"/>
             <a:r>
-              <a:rPr sz="3200"/>
+              <a:rPr sz="3200">
+                <a:solidFill>
+                  <a:schemeClr val="tx1"/>
+                </a:solidFill>
+              </a:rPr>
               <a:t>Por onde for</a:t>
             </a:r>
           </a:p>
           <a:p xmlns:a="http://schemas.openxmlformats.org/drawingml/2006/main">
             <a:pPr algn="ctr"/>
             <a:r>
-              <a:rPr sz="3200"/>
+              <a:rPr sz="3200">
+                <a:solidFill>
+                  <a:schemeClr val="tx1"/>
+                </a:solidFill>
+              </a:rPr>
               <a:t>Serei tuas mãos</a:t>
             </a:r>
           </a:p>
           <a:p xmlns:a="http://schemas.openxmlformats.org/drawingml/2006/main">
             <a:pPr algn="ctr"/>
             <a:r>
-              <a:rPr sz="3200"/>
+              <a:rPr sz="3200">
+                <a:solidFill>
+                  <a:schemeClr val="tx1"/>
+                </a:solidFill>
+              </a:rPr>
               <a:t>Aqui ou onde me enviar</a:t>
             </a:r>
           </a:p>
           <a:p xmlns:a="http://schemas.openxmlformats.org/drawingml/2006/main">
             <a:pPr algn="ctr"/>
             <a:r>
-              <a:rPr sz="3200"/>
+              <a:rPr sz="3200">
+                <a:solidFill>
+                  <a:schemeClr val="tx1"/>
+                </a:solidFill>
+              </a:rPr>
               <a:t>Me entrego, podes me usar</a:t>
             </a:r>
           </a:p>
           <a:p xmlns:a="http://schemas.openxmlformats.org/drawingml/2006/main">
             <a:pPr algn="ctr"/>
             <a:r>
-              <a:rPr sz="3200"/>
+              <a:rPr sz="3200">
+                <a:solidFill>
+                  <a:schemeClr val="tx1"/>
+                </a:solidFill>
+              </a:rPr>
               <a:t>Por onde for</a:t>
             </a:r>
           </a:p>
@@ -623,7 +1102,9 @@
           <p:cNvSpPr>
             <a:spLocks xmlns:a="http://schemas.openxmlformats.org/drawingml/2006/main" noGrp="1"/>
           </p:cNvSpPr>
-          <p:nvPr/>
+          <p:nvPr>
+            <p:ph type="body"/>
+          </p:nvPr>
         </p:nvSpPr>
         <p:spPr>
           <a:xfrm xmlns:a="http://schemas.openxmlformats.org/drawingml/2006/main">
@@ -637,56 +1118,88 @@
           <a:p xmlns:a="http://schemas.openxmlformats.org/drawingml/2006/main">
             <a:pPr algn="ctr"/>
             <a:r>
-              <a:rPr sz="3200"/>
+              <a:rPr sz="3200">
+                <a:solidFill>
+                  <a:schemeClr val="tx1"/>
+                </a:solidFill>
+              </a:rPr>
               <a:t>Seja expressão do teu amor</a:t>
             </a:r>
           </a:p>
           <a:p xmlns:a="http://schemas.openxmlformats.org/drawingml/2006/main">
             <a:pPr algn="ctr"/>
             <a:r>
-              <a:rPr sz="3200"/>
+              <a:rPr sz="3200">
+                <a:solidFill>
+                  <a:schemeClr val="tx1"/>
+                </a:solidFill>
+              </a:rPr>
               <a:t>Ao redor do mundo</a:t>
             </a:r>
           </a:p>
           <a:p xmlns:a="http://schemas.openxmlformats.org/drawingml/2006/main">
             <a:pPr algn="ctr"/>
             <a:r>
-              <a:rPr sz="3200"/>
+              <a:rPr sz="3200">
+                <a:solidFill>
+                  <a:schemeClr val="tx1"/>
+                </a:solidFill>
+              </a:rPr>
               <a:t>Ou do outro lado dessa rua</a:t>
             </a:r>
           </a:p>
           <a:p xmlns:a="http://schemas.openxmlformats.org/drawingml/2006/main">
             <a:pPr algn="ctr"/>
             <a:r>
-              <a:rPr sz="3200"/>
+              <a:rPr sz="3200">
+                <a:solidFill>
+                  <a:schemeClr val="tx1"/>
+                </a:solidFill>
+              </a:rPr>
               <a:t>Falarei do teu amor</a:t>
             </a:r>
           </a:p>
           <a:p xmlns:a="http://schemas.openxmlformats.org/drawingml/2006/main">
             <a:pPr algn="ctr"/>
             <a:r>
-              <a:rPr sz="3200"/>
+              <a:rPr sz="3200">
+                <a:solidFill>
+                  <a:schemeClr val="tx1"/>
+                </a:solidFill>
+              </a:rPr>
               <a:t>Por onde for</a:t>
             </a:r>
           </a:p>
           <a:p xmlns:a="http://schemas.openxmlformats.org/drawingml/2006/main">
             <a:pPr algn="ctr"/>
             <a:r>
-              <a:rPr sz="3200"/>
+              <a:rPr sz="3200">
+                <a:solidFill>
+                  <a:schemeClr val="tx1"/>
+                </a:solidFill>
+              </a:rPr>
               <a:t>Serei tuas mãos</a:t>
             </a:r>
           </a:p>
           <a:p xmlns:a="http://schemas.openxmlformats.org/drawingml/2006/main">
             <a:pPr algn="ctr"/>
             <a:r>
-              <a:rPr sz="3200"/>
+              <a:rPr sz="3200">
+                <a:solidFill>
+                  <a:schemeClr val="tx1"/>
+                </a:solidFill>
+              </a:rPr>
               <a:t>Aqui ou onde me enviar</a:t>
             </a:r>
           </a:p>
           <a:p xmlns:a="http://schemas.openxmlformats.org/drawingml/2006/main">
             <a:pPr algn="ctr"/>
             <a:r>
-              <a:rPr sz="3200"/>
+              <a:rPr sz="3200">
+                <a:solidFill>
+                  <a:schemeClr val="tx1"/>
+                </a:solidFill>
+              </a:rPr>
               <a:t>Me entrego, podes me usar</a:t>
             </a:r>
           </a:p>
@@ -718,7 +1231,9 @@
           <p:cNvSpPr>
             <a:spLocks xmlns:a="http://schemas.openxmlformats.org/drawingml/2006/main" noGrp="1"/>
           </p:cNvSpPr>
-          <p:nvPr/>
+          <p:nvPr>
+            <p:ph type="body"/>
+          </p:nvPr>
         </p:nvSpPr>
         <p:spPr>
           <a:xfrm xmlns:a="http://schemas.openxmlformats.org/drawingml/2006/main">
@@ -732,35 +1247,55 @@
           <a:p xmlns:a="http://schemas.openxmlformats.org/drawingml/2006/main">
             <a:pPr algn="ctr"/>
             <a:r>
-              <a:rPr sz="3200"/>
+              <a:rPr sz="3200">
+                <a:solidFill>
+                  <a:schemeClr val="tx1"/>
+                </a:solidFill>
+              </a:rPr>
               <a:t>Por onde for</a:t>
             </a:r>
           </a:p>
           <a:p xmlns:a="http://schemas.openxmlformats.org/drawingml/2006/main">
             <a:pPr algn="ctr"/>
             <a:r>
-              <a:rPr sz="3200"/>
+              <a:rPr sz="3200">
+                <a:solidFill>
+                  <a:schemeClr val="tx1"/>
+                </a:solidFill>
+              </a:rPr>
               <a:t>Seja expressão do teu amor</a:t>
             </a:r>
           </a:p>
           <a:p xmlns:a="http://schemas.openxmlformats.org/drawingml/2006/main">
             <a:pPr algn="ctr"/>
             <a:r>
-              <a:rPr sz="3200"/>
+              <a:rPr sz="3200">
+                <a:solidFill>
+                  <a:schemeClr val="tx1"/>
+                </a:solidFill>
+              </a:rPr>
               <a:t>Ao redor do mundo</a:t>
             </a:r>
           </a:p>
           <a:p xmlns:a="http://schemas.openxmlformats.org/drawingml/2006/main">
             <a:pPr algn="ctr"/>
             <a:r>
-              <a:rPr sz="3200"/>
+              <a:rPr sz="3200">
+                <a:solidFill>
+                  <a:schemeClr val="tx1"/>
+                </a:solidFill>
+              </a:rPr>
               <a:t>Ou do outro lado dessa rua</a:t>
             </a:r>
           </a:p>
           <a:p xmlns:a="http://schemas.openxmlformats.org/drawingml/2006/main">
             <a:pPr algn="ctr"/>
             <a:r>
-              <a:rPr sz="3200"/>
+              <a:rPr sz="3200">
+                <a:solidFill>
+                  <a:schemeClr val="tx1"/>
+                </a:solidFill>
+              </a:rPr>
               <a:t>Falarei do teu amor</a:t>
             </a:r>
           </a:p>

</xml_diff>